<commit_message>
Cambios menores en presentaión 1
</commit_message>
<xml_diff>
--- a/Semana1/1_PresentaciónCurso.pptx
+++ b/Semana1/1_PresentaciónCurso.pptx
@@ -14,8 +14,9 @@
     <p:sldId id="265" r:id="rId8"/>
     <p:sldId id="263" r:id="rId9"/>
     <p:sldId id="267" r:id="rId10"/>
-    <p:sldId id="266" r:id="rId11"/>
-    <p:sldId id="264" r:id="rId12"/>
+    <p:sldId id="268" r:id="rId11"/>
+    <p:sldId id="266" r:id="rId12"/>
+    <p:sldId id="264" r:id="rId13"/>
   </p:sldIdLst>
   <p:sldSz cx="9144000" cy="6858000" type="screen4x3"/>
   <p:notesSz cx="6858000" cy="9144000"/>
@@ -3203,6 +3204,10 @@
           <a:bodyPr/>
           <a:lstStyle/>
           <a:p>
+            <a:r>
+              <a:rPr lang="es-MX" dirty="0" smtClean="0"/>
+              <a:t>Repositorio</a:t>
+            </a:r>
             <a:endParaRPr lang="es-MX" dirty="0"/>
           </a:p>
         </p:txBody>
@@ -3222,22 +3227,53 @@
           <a:bodyPr/>
           <a:lstStyle/>
           <a:p>
+            <a:pPr algn="just"/>
+            <a:endParaRPr lang="es-MX" smtClean="0"/>
+          </a:p>
+          <a:p>
+            <a:pPr algn="just"/>
+            <a:r>
+              <a:rPr lang="es-MX" smtClean="0"/>
+              <a:t>Puedes </a:t>
+            </a:r>
+            <a:r>
+              <a:rPr lang="es-MX" dirty="0" smtClean="0"/>
+              <a:t>descargar los fuentes de las prácticas, presentaciones, software, etc. </a:t>
+            </a:r>
+          </a:p>
+          <a:p>
+            <a:pPr marL="800100" lvl="2" indent="0">
+              <a:buNone/>
+            </a:pPr>
+            <a:endParaRPr lang="es-MX" dirty="0">
+              <a:hlinkClick r:id="rId2"/>
+            </a:endParaRPr>
+          </a:p>
+          <a:p>
+            <a:pPr marL="0" indent="0" algn="ctr">
+              <a:buNone/>
+            </a:pPr>
+            <a:r>
+              <a:rPr lang="es-MX" dirty="0" smtClean="0">
+                <a:hlinkClick r:id="rId2"/>
+              </a:rPr>
+              <a:t>http</a:t>
+            </a:r>
+            <a:r>
+              <a:rPr lang="es-MX" dirty="0">
+                <a:hlinkClick r:id="rId2"/>
+              </a:rPr>
+              <a:t>://code.google.com/p/acii</a:t>
+            </a:r>
+            <a:r>
+              <a:rPr lang="es-MX" dirty="0" smtClean="0">
+                <a:hlinkClick r:id="rId2"/>
+              </a:rPr>
+              <a:t>/</a:t>
+            </a:r>
             <a:endParaRPr lang="es-MX" dirty="0" smtClean="0"/>
           </a:p>
           <a:p>
-            <a:pPr marL="0" indent="0">
-              <a:buNone/>
-            </a:pPr>
-            <a:endParaRPr lang="es-MX" dirty="0" smtClean="0"/>
-          </a:p>
-          <a:p>
-            <a:pPr marL="0" indent="0" algn="ctr">
-              <a:buNone/>
-            </a:pPr>
-            <a:r>
-              <a:rPr lang="es-MX" dirty="0" smtClean="0"/>
-              <a:t>¿Dudas?</a:t>
-            </a:r>
             <a:endParaRPr lang="es-MX" dirty="0"/>
           </a:p>
         </p:txBody>
@@ -3245,7 +3281,7 @@
     </p:spTree>
     <p:extLst>
       <p:ext uri="{BB962C8B-B14F-4D97-AF65-F5344CB8AC3E}">
-        <p14:creationId xmlns:p14="http://schemas.microsoft.com/office/powerpoint/2010/main" val="327286550"/>
+        <p14:creationId xmlns:p14="http://schemas.microsoft.com/office/powerpoint/2010/main" val="885376474"/>
       </p:ext>
     </p:extLst>
   </p:cSld>
@@ -3294,6 +3330,97 @@
           <a:bodyPr/>
           <a:lstStyle/>
           <a:p>
+            <a:endParaRPr lang="es-MX" dirty="0"/>
+          </a:p>
+        </p:txBody>
+      </p:sp>
+      <p:sp>
+        <p:nvSpPr>
+          <p:cNvPr id="3" name="2 Marcador de contenido"/>
+          <p:cNvSpPr>
+            <a:spLocks noGrp="1"/>
+          </p:cNvSpPr>
+          <p:nvPr>
+            <p:ph idx="1"/>
+          </p:nvPr>
+        </p:nvSpPr>
+        <p:spPr/>
+        <p:txBody>
+          <a:bodyPr/>
+          <a:lstStyle/>
+          <a:p>
+            <a:endParaRPr lang="es-MX" dirty="0" smtClean="0"/>
+          </a:p>
+          <a:p>
+            <a:pPr marL="0" indent="0">
+              <a:buNone/>
+            </a:pPr>
+            <a:endParaRPr lang="es-MX" dirty="0" smtClean="0"/>
+          </a:p>
+          <a:p>
+            <a:pPr marL="0" indent="0" algn="ctr">
+              <a:buNone/>
+            </a:pPr>
+            <a:r>
+              <a:rPr lang="es-MX" dirty="0" smtClean="0"/>
+              <a:t>¿Dudas?</a:t>
+            </a:r>
+            <a:endParaRPr lang="es-MX" dirty="0"/>
+          </a:p>
+        </p:txBody>
+      </p:sp>
+    </p:spTree>
+    <p:extLst>
+      <p:ext uri="{BB962C8B-B14F-4D97-AF65-F5344CB8AC3E}">
+        <p14:creationId xmlns:p14="http://schemas.microsoft.com/office/powerpoint/2010/main" val="327286550"/>
+      </p:ext>
+    </p:extLst>
+  </p:cSld>
+  <p:clrMapOvr>
+    <a:masterClrMapping/>
+  </p:clrMapOvr>
+  <p:timing>
+    <p:tnLst>
+      <p:par>
+        <p:cTn id="1" dur="indefinite" restart="never" nodeType="tmRoot"/>
+      </p:par>
+    </p:tnLst>
+  </p:timing>
+</p:sld>
+</file>
+
+<file path=ppt/slides/slide12.xml><?xml version="1.0" encoding="utf-8"?>
+<p:sld xmlns:a="http://schemas.openxmlformats.org/drawingml/2006/main" xmlns:r="http://schemas.openxmlformats.org/officeDocument/2006/relationships" xmlns:p="http://schemas.openxmlformats.org/presentationml/2006/main">
+  <p:cSld>
+    <p:spTree>
+      <p:nvGrpSpPr>
+        <p:cNvPr id="1" name=""/>
+        <p:cNvGrpSpPr/>
+        <p:nvPr/>
+      </p:nvGrpSpPr>
+      <p:grpSpPr>
+        <a:xfrm>
+          <a:off x="0" y="0"/>
+          <a:ext cx="0" cy="0"/>
+          <a:chOff x="0" y="0"/>
+          <a:chExt cx="0" cy="0"/>
+        </a:xfrm>
+      </p:grpSpPr>
+      <p:sp>
+        <p:nvSpPr>
+          <p:cNvPr id="2" name="1 Título"/>
+          <p:cNvSpPr>
+            <a:spLocks noGrp="1"/>
+          </p:cNvSpPr>
+          <p:nvPr>
+            <p:ph type="title"/>
+          </p:nvPr>
+        </p:nvSpPr>
+        <p:spPr/>
+        <p:txBody>
+          <a:bodyPr/>
+          <a:lstStyle/>
+          <a:p>
             <a:r>
               <a:rPr lang="es-MX" dirty="0" smtClean="0"/>
               <a:t>Tarea 1	</a:t>
@@ -3385,7 +3512,7 @@
             <a:fld id="{9165EDF6-6E62-4B65-BDEE-6578CE433DA0}" type="slidenum">
               <a:rPr lang="es-MX" smtClean="0"/>
               <a:pPr/>
-              <a:t>11</a:t>
+              <a:t>12</a:t>
             </a:fld>
             <a:endParaRPr lang="es-MX"/>
           </a:p>
@@ -4345,7 +4472,6 @@
               <a:rPr lang="es-MX" dirty="0" smtClean="0"/>
               <a:t> C++, Compilador de C </a:t>
             </a:r>
-            <a:endParaRPr lang="es-MX" dirty="0" smtClean="0"/>
           </a:p>
           <a:p>
             <a:pPr lvl="1"/>
@@ -4361,7 +4487,6 @@
               <a:rPr lang="es-MX" dirty="0" smtClean="0"/>
               <a:t> </a:t>
             </a:r>
-            <a:endParaRPr lang="es-MX" dirty="0" smtClean="0"/>
           </a:p>
           <a:p>
             <a:pPr lvl="1"/>
@@ -4473,13 +4598,8 @@
             </a:pPr>
             <a:r>
               <a:rPr lang="es-MX" dirty="0" smtClean="0"/>
-              <a:t>Instructor</a:t>
-            </a:r>
-            <a:r>
-              <a:rPr lang="es-MX" dirty="0" smtClean="0"/>
-              <a:t>:</a:t>
-            </a:r>
-            <a:endParaRPr lang="es-MX" dirty="0" smtClean="0"/>
+              <a:t>Instructor:</a:t>
+            </a:r>
           </a:p>
           <a:p>
             <a:pPr>
@@ -4690,7 +4810,43 @@
           <a:bodyPr/>
           <a:lstStyle/>
           <a:p>
-            <a:endParaRPr lang="es-MX"/>
+            <a:endParaRPr lang="es-MX" dirty="0" smtClean="0"/>
+          </a:p>
+          <a:p>
+            <a:r>
+              <a:rPr lang="es-MX" dirty="0" smtClean="0"/>
+              <a:t>Febrero: 11, 12, </a:t>
+            </a:r>
+            <a:r>
+              <a:rPr lang="es-MX" i="1" dirty="0" smtClean="0"/>
+              <a:t>22</a:t>
+            </a:r>
+          </a:p>
+          <a:p>
+            <a:r>
+              <a:rPr lang="es-MX" dirty="0" smtClean="0"/>
+              <a:t>Marzo: 18</a:t>
+            </a:r>
+          </a:p>
+          <a:p>
+            <a:r>
+              <a:rPr lang="es-MX" dirty="0" smtClean="0"/>
+              <a:t>Mayo: 1, </a:t>
+            </a:r>
+            <a:r>
+              <a:rPr lang="es-MX" i="1" dirty="0" smtClean="0"/>
+              <a:t>10</a:t>
+            </a:r>
+            <a:r>
+              <a:rPr lang="es-MX" dirty="0" smtClean="0"/>
+              <a:t>, 15</a:t>
+            </a:r>
+          </a:p>
+          <a:p>
+            <a:endParaRPr lang="es-MX" dirty="0" smtClean="0"/>
+          </a:p>
+          <a:p>
+            <a:endParaRPr lang="es-MX" dirty="0"/>
           </a:p>
         </p:txBody>
       </p:sp>
@@ -4704,6 +4860,13 @@
   <p:clrMapOvr>
     <a:masterClrMapping/>
   </p:clrMapOvr>
+  <p:timing>
+    <p:tnLst>
+      <p:par>
+        <p:cTn id="1" dur="indefinite" restart="never" nodeType="tmRoot"/>
+      </p:par>
+    </p:tnLst>
+  </p:timing>
 </p:sld>
 </file>
 

</xml_diff>

<commit_message>
Cambios menores en curso.
</commit_message>
<xml_diff>
--- a/Semana1/1_PresentaciónCurso.pptx
+++ b/Semana1/1_PresentaciónCurso.pptx
@@ -299,7 +299,7 @@
           <a:p>
             <a:fld id="{9F0C0C62-870F-4707-9102-AF2700A0CBC3}" type="datetimeFigureOut">
               <a:rPr lang="es-MX" smtClean="0"/>
-              <a:t>07/02/2013</a:t>
+              <a:t>21/02/2013</a:t>
             </a:fld>
             <a:endParaRPr lang="es-MX"/>
           </a:p>
@@ -469,7 +469,7 @@
           <a:p>
             <a:fld id="{9F0C0C62-870F-4707-9102-AF2700A0CBC3}" type="datetimeFigureOut">
               <a:rPr lang="es-MX" smtClean="0"/>
-              <a:t>07/02/2013</a:t>
+              <a:t>21/02/2013</a:t>
             </a:fld>
             <a:endParaRPr lang="es-MX"/>
           </a:p>
@@ -649,7 +649,7 @@
           <a:p>
             <a:fld id="{9F0C0C62-870F-4707-9102-AF2700A0CBC3}" type="datetimeFigureOut">
               <a:rPr lang="es-MX" smtClean="0"/>
-              <a:t>07/02/2013</a:t>
+              <a:t>21/02/2013</a:t>
             </a:fld>
             <a:endParaRPr lang="es-MX"/>
           </a:p>
@@ -819,7 +819,7 @@
           <a:p>
             <a:fld id="{9F0C0C62-870F-4707-9102-AF2700A0CBC3}" type="datetimeFigureOut">
               <a:rPr lang="es-MX" smtClean="0"/>
-              <a:t>07/02/2013</a:t>
+              <a:t>21/02/2013</a:t>
             </a:fld>
             <a:endParaRPr lang="es-MX"/>
           </a:p>
@@ -1065,7 +1065,7 @@
           <a:p>
             <a:fld id="{9F0C0C62-870F-4707-9102-AF2700A0CBC3}" type="datetimeFigureOut">
               <a:rPr lang="es-MX" smtClean="0"/>
-              <a:t>07/02/2013</a:t>
+              <a:t>21/02/2013</a:t>
             </a:fld>
             <a:endParaRPr lang="es-MX"/>
           </a:p>
@@ -1353,7 +1353,7 @@
           <a:p>
             <a:fld id="{9F0C0C62-870F-4707-9102-AF2700A0CBC3}" type="datetimeFigureOut">
               <a:rPr lang="es-MX" smtClean="0"/>
-              <a:t>07/02/2013</a:t>
+              <a:t>21/02/2013</a:t>
             </a:fld>
             <a:endParaRPr lang="es-MX"/>
           </a:p>
@@ -1775,7 +1775,7 @@
           <a:p>
             <a:fld id="{9F0C0C62-870F-4707-9102-AF2700A0CBC3}" type="datetimeFigureOut">
               <a:rPr lang="es-MX" smtClean="0"/>
-              <a:t>07/02/2013</a:t>
+              <a:t>21/02/2013</a:t>
             </a:fld>
             <a:endParaRPr lang="es-MX"/>
           </a:p>
@@ -1893,7 +1893,7 @@
           <a:p>
             <a:fld id="{9F0C0C62-870F-4707-9102-AF2700A0CBC3}" type="datetimeFigureOut">
               <a:rPr lang="es-MX" smtClean="0"/>
-              <a:t>07/02/2013</a:t>
+              <a:t>21/02/2013</a:t>
             </a:fld>
             <a:endParaRPr lang="es-MX"/>
           </a:p>
@@ -1988,7 +1988,7 @@
           <a:p>
             <a:fld id="{9F0C0C62-870F-4707-9102-AF2700A0CBC3}" type="datetimeFigureOut">
               <a:rPr lang="es-MX" smtClean="0"/>
-              <a:t>07/02/2013</a:t>
+              <a:t>21/02/2013</a:t>
             </a:fld>
             <a:endParaRPr lang="es-MX"/>
           </a:p>
@@ -2265,7 +2265,7 @@
           <a:p>
             <a:fld id="{9F0C0C62-870F-4707-9102-AF2700A0CBC3}" type="datetimeFigureOut">
               <a:rPr lang="es-MX" smtClean="0"/>
-              <a:t>07/02/2013</a:t>
+              <a:t>21/02/2013</a:t>
             </a:fld>
             <a:endParaRPr lang="es-MX"/>
           </a:p>
@@ -2518,7 +2518,7 @@
           <a:p>
             <a:fld id="{9F0C0C62-870F-4707-9102-AF2700A0CBC3}" type="datetimeFigureOut">
               <a:rPr lang="es-MX" smtClean="0"/>
-              <a:t>07/02/2013</a:t>
+              <a:t>21/02/2013</a:t>
             </a:fld>
             <a:endParaRPr lang="es-MX"/>
           </a:p>
@@ -2731,7 +2731,7 @@
           <a:p>
             <a:fld id="{9F0C0C62-870F-4707-9102-AF2700A0CBC3}" type="datetimeFigureOut">
               <a:rPr lang="es-MX" smtClean="0"/>
-              <a:t>07/02/2013</a:t>
+              <a:t>21/02/2013</a:t>
             </a:fld>
             <a:endParaRPr lang="es-MX"/>
           </a:p>
@@ -3488,7 +3488,7 @@
             <a:fld id="{3A7C8DFA-CB23-484D-8F68-0C49A7495FD9}" type="datetime1">
               <a:rPr lang="es-MX" smtClean="0"/>
               <a:pPr/>
-              <a:t>07/02/2013</a:t>
+              <a:t>21/02/2013</a:t>
             </a:fld>
             <a:endParaRPr lang="es-MX"/>
           </a:p>
@@ -3632,7 +3632,7 @@
             <a:fld id="{C9FCB235-7E5D-475A-812E-153CA0960F51}" type="datetime1">
               <a:rPr lang="es-MX" smtClean="0"/>
               <a:pPr/>
-              <a:t>07/02/2013</a:t>
+              <a:t>21/02/2013</a:t>
             </a:fld>
             <a:endParaRPr lang="es-MX"/>
           </a:p>
@@ -3748,7 +3748,19 @@
           <a:p>
             <a:r>
               <a:rPr lang="es-MX" dirty="0" smtClean="0"/>
-              <a:t>Tareas y participaciones		10%</a:t>
+              <a:t>Tareas y participaciones	</a:t>
+            </a:r>
+            <a:r>
+              <a:rPr lang="es-MX" smtClean="0"/>
+              <a:t>	</a:t>
+            </a:r>
+            <a:r>
+              <a:rPr lang="es-MX" smtClean="0"/>
+              <a:t>20</a:t>
+            </a:r>
+            <a:r>
+              <a:rPr lang="es-MX" dirty="0" smtClean="0"/>
+              <a:t>%</a:t>
             </a:r>
           </a:p>
           <a:p>
@@ -3760,7 +3772,15 @@
           <a:p>
             <a:r>
               <a:rPr lang="es-MX" dirty="0" smtClean="0"/>
-              <a:t>Exámenes parciales			60%</a:t>
+              <a:t>Exámenes parciales			</a:t>
+            </a:r>
+            <a:r>
+              <a:rPr lang="es-MX" dirty="0" smtClean="0"/>
+              <a:t>50</a:t>
+            </a:r>
+            <a:r>
+              <a:rPr lang="es-MX" dirty="0" smtClean="0"/>
+              <a:t>%</a:t>
             </a:r>
           </a:p>
           <a:p>
@@ -3789,7 +3809,7 @@
             <a:fld id="{0ABAB513-88A9-4765-A1DE-5D00E8DADFE0}" type="datetime1">
               <a:rPr lang="es-MX" smtClean="0"/>
               <a:pPr/>
-              <a:t>07/02/2013</a:t>
+              <a:t>21/02/2013</a:t>
             </a:fld>
             <a:endParaRPr lang="es-MX"/>
           </a:p>
@@ -3931,7 +3951,7 @@
             <a:fld id="{8FD867C6-F107-488F-A933-BF3D3FBF1951}" type="datetime1">
               <a:rPr lang="es-MX" smtClean="0"/>
               <a:pPr/>
-              <a:t>07/02/2013</a:t>
+              <a:t>21/02/2013</a:t>
             </a:fld>
             <a:endParaRPr lang="es-MX"/>
           </a:p>
@@ -4092,7 +4112,7 @@
             <a:fld id="{B528ABA0-4FC6-46A5-97CF-F42195146A3D}" type="datetime1">
               <a:rPr lang="es-MX" smtClean="0"/>
               <a:pPr/>
-              <a:t>07/02/2013</a:t>
+              <a:t>21/02/2013</a:t>
             </a:fld>
             <a:endParaRPr lang="es-MX"/>
           </a:p>
@@ -4245,7 +4265,7 @@
             <a:fld id="{C0606DD3-4C6E-4347-BC8F-32146C57FC3B}" type="datetime1">
               <a:rPr lang="es-MX" smtClean="0"/>
               <a:pPr/>
-              <a:t>07/02/2013</a:t>
+              <a:t>21/02/2013</a:t>
             </a:fld>
             <a:endParaRPr lang="es-MX"/>
           </a:p>
@@ -4678,7 +4698,15 @@
             <a:pPr lvl="1"/>
             <a:r>
               <a:rPr lang="es-MX" dirty="0" smtClean="0"/>
-              <a:t>Clases: Lunes (104, 19-21pm), Martes (106, 17-19pm), Jueves (106, 17-19)  </a:t>
+              <a:t>Clases: Lunes (104, 19-21pm), Martes (106, 17-19pm), </a:t>
+            </a:r>
+            <a:r>
+              <a:rPr lang="es-MX" smtClean="0"/>
+              <a:t>Jueves (CC3, </a:t>
+            </a:r>
+            <a:r>
+              <a:rPr lang="es-MX" dirty="0" smtClean="0"/>
+              <a:t>17-19)  </a:t>
             </a:r>
             <a:endParaRPr lang="es-MX" dirty="0"/>
           </a:p>
@@ -4729,7 +4757,7 @@
             <a:fld id="{F963ABEF-4D34-4683-B2AD-E0B4ABF261F1}" type="datetime1">
               <a:rPr lang="es-MX" smtClean="0"/>
               <a:pPr/>
-              <a:t>07/02/2013</a:t>
+              <a:t>21/02/2013</a:t>
             </a:fld>
             <a:endParaRPr lang="es-MX"/>
           </a:p>

</xml_diff>